<commit_message>
Update pptx, add slide
</commit_message>
<xml_diff>
--- a/assets/React.pptx
+++ b/assets/React.pptx
@@ -26,9 +26,10 @@
     <p:sldId id="282" r:id="rId20"/>
     <p:sldId id="283" r:id="rId21"/>
     <p:sldId id="270" r:id="rId22"/>
-    <p:sldId id="276" r:id="rId23"/>
-    <p:sldId id="274" r:id="rId24"/>
-    <p:sldId id="265" r:id="rId25"/>
+    <p:sldId id="284" r:id="rId23"/>
+    <p:sldId id="276" r:id="rId24"/>
+    <p:sldId id="274" r:id="rId25"/>
+    <p:sldId id="265" r:id="rId26"/>
   </p:sldIdLst>
   <p:sldSz cx="12192000" cy="6858000"/>
   <p:notesSz cx="6858000" cy="9144000"/>
@@ -4263,11 +4264,7 @@
           <a:p>
             <a:r>
               <a:rPr lang="ru-RU" dirty="0" smtClean="0"/>
-              <a:t>Поведение </a:t>
-            </a:r>
-            <a:r>
-              <a:rPr lang="ru-RU" dirty="0" smtClean="0"/>
-              <a:t>компонента</a:t>
+              <a:t>Поведение компонента</a:t>
             </a:r>
             <a:endParaRPr lang="en-US" dirty="0" smtClean="0"/>
           </a:p>
@@ -5146,23 +5143,7 @@
                   <a:srgbClr val="FFFFFF"/>
                 </a:solidFill>
               </a:rPr>
-              <a:t>Иногда несколько тестов отличаются только значениями </a:t>
-            </a:r>
-            <a:r>
-              <a:rPr lang="ru-RU" sz="1500" dirty="0" smtClean="0">
-                <a:solidFill>
-                  <a:srgbClr val="FFFFFF"/>
-                </a:solidFill>
-              </a:rPr>
-              <a:t>одной </a:t>
-            </a:r>
-            <a:r>
-              <a:rPr lang="ru-RU" sz="1500" dirty="0" smtClean="0">
-                <a:solidFill>
-                  <a:srgbClr val="FFFFFF"/>
-                </a:solidFill>
-              </a:rPr>
-              <a:t>входной переменной. Такие тесты могут быть сгенерированы с помощью функции</a:t>
+              <a:t>Иногда несколько тестов отличаются только значениями одной входной переменной. Такие тесты могут быть сгенерированы с помощью функции</a:t>
             </a:r>
             <a:endParaRPr lang="ru-RU" dirty="0"/>
           </a:p>
@@ -5478,7 +5459,7 @@
           <a:p>
             <a:r>
               <a:rPr lang="ru-RU" dirty="0" smtClean="0"/>
-              <a:t>Примеры</a:t>
+              <a:t>Способ тестирования компонентов</a:t>
             </a:r>
             <a:endParaRPr lang="en-US" dirty="0"/>
           </a:p>
@@ -5497,88 +5478,138 @@
         <p:spPr/>
         <p:txBody>
           <a:bodyPr>
-            <a:normAutofit lnSpcReduction="10000"/>
+            <a:normAutofit fontScale="62500" lnSpcReduction="20000"/>
           </a:bodyPr>
           <a:lstStyle/>
           <a:p>
             <a:r>
-              <a:rPr lang="en-US" dirty="0">
+              <a:rPr lang="en-US" b="1" dirty="0">
                 <a:hlinkClick r:id="rId2"/>
               </a:rPr>
-              <a:t>https://github.com/facebook/jest/blob/master/e2e/__tests__/</a:t>
-            </a:r>
-            <a:r>
-              <a:rPr lang="en-US" dirty="0" smtClean="0">
+              <a:t>https://</a:t>
+            </a:r>
+            <a:r>
+              <a:rPr lang="en-US" b="1" dirty="0" smtClean="0">
                 <a:hlinkClick r:id="rId2"/>
               </a:rPr>
-              <a:t>console.test.js</a:t>
-            </a:r>
-            <a:endParaRPr lang="ru-RU" dirty="0" smtClean="0"/>
-          </a:p>
-          <a:p>
-            <a:r>
-              <a:rPr lang="en-US" dirty="0">
-                <a:hlinkClick r:id="rId3"/>
-              </a:rPr>
-              <a:t>https://</a:t>
-            </a:r>
-            <a:r>
-              <a:rPr lang="en-US" dirty="0" smtClean="0">
-                <a:hlinkClick r:id="rId3"/>
-              </a:rPr>
-              <a:t>github.com/reduxjs/redux/blob/master/examples/tree-view/src/containers/Node.spec.js</a:t>
-            </a:r>
-            <a:endParaRPr lang="ru-RU" dirty="0" smtClean="0"/>
-          </a:p>
-          <a:p>
-            <a:r>
-              <a:rPr lang="en-US" dirty="0">
-                <a:hlinkClick r:id="rId4"/>
-              </a:rPr>
-              <a:t>https://</a:t>
-            </a:r>
-            <a:r>
-              <a:rPr lang="en-US" dirty="0" smtClean="0">
-                <a:hlinkClick r:id="rId4"/>
-              </a:rPr>
-              <a:t>github.com/reduxjs/redux/blob/master/examples/tree-view/src/reducers/index.spec.js</a:t>
-            </a:r>
-            <a:endParaRPr lang="ru-RU" dirty="0" smtClean="0"/>
-          </a:p>
-          <a:p>
-            <a:r>
-              <a:rPr lang="en-US" dirty="0">
-                <a:hlinkClick r:id="rId5"/>
-              </a:rPr>
-              <a:t>https://github.com/tb/redux/tree/react-testing/examples/todomvc/src/components/__tests</a:t>
-            </a:r>
-            <a:r>
-              <a:rPr lang="en-US" dirty="0" smtClean="0">
-                <a:hlinkClick r:id="rId5"/>
-              </a:rPr>
-              <a:t>__</a:t>
-            </a:r>
-            <a:endParaRPr lang="ru-RU" dirty="0" smtClean="0"/>
-          </a:p>
-          <a:p>
-            <a:r>
-              <a:rPr lang="en-US" dirty="0">
-                <a:hlinkClick r:id="rId6"/>
-              </a:rPr>
-              <a:t>https://</a:t>
-            </a:r>
-            <a:r>
-              <a:rPr lang="en-US" dirty="0" smtClean="0">
-                <a:hlinkClick r:id="rId6"/>
-              </a:rPr>
-              <a:t>github.com/mui-org/material-ui/blob/303199d39b42a321d28347d8440d69166f872f27/packages/material-ui/src/Checkbox/Checkbox.test.js</a:t>
-            </a:r>
-            <a:endParaRPr lang="en-US" dirty="0" smtClean="0"/>
-          </a:p>
-          <a:p>
-            <a:pPr marL="0" indent="0">
-              <a:buNone/>
-            </a:pPr>
+              <a:t>medium.freecodecamp.org/the-right-way-to-test-react-components-548a4736ab22</a:t>
+            </a:r>
+            <a:r>
+              <a:rPr lang="ru-RU" b="1" dirty="0" smtClean="0"/>
+              <a:t> </a:t>
+            </a:r>
+          </a:p>
+          <a:p>
+            <a:r>
+              <a:rPr lang="en-US" b="1" dirty="0" smtClean="0"/>
+              <a:t>Find </a:t>
+            </a:r>
+            <a:r>
+              <a:rPr lang="en-US" b="1" dirty="0"/>
+              <a:t>your Component Contract </a:t>
+            </a:r>
+            <a:r>
+              <a:rPr lang="en-US" b="1" dirty="0" smtClean="0"/>
+              <a:t>first</a:t>
+            </a:r>
+          </a:p>
+          <a:p>
+            <a:pPr lvl="1"/>
+            <a:r>
+              <a:rPr lang="en-US" dirty="0"/>
+              <a:t>What do I do with the props I receive?</a:t>
+            </a:r>
+          </a:p>
+          <a:p>
+            <a:pPr lvl="1"/>
+            <a:r>
+              <a:rPr lang="en-US" dirty="0"/>
+              <a:t>What components do I render? What do I pass to those components?</a:t>
+            </a:r>
+          </a:p>
+          <a:p>
+            <a:pPr lvl="1"/>
+            <a:r>
+              <a:rPr lang="en-US" dirty="0"/>
+              <a:t>Do I ever keep anything in state? If so, do I invalidate it when receiving new props? When do I update state?</a:t>
+            </a:r>
+          </a:p>
+          <a:p>
+            <a:pPr lvl="1"/>
+            <a:r>
+              <a:rPr lang="en-US" dirty="0"/>
+              <a:t>If a user interacts with me or a child component calls a callback I passed to it, what do I do?</a:t>
+            </a:r>
+          </a:p>
+          <a:p>
+            <a:pPr lvl="1"/>
+            <a:r>
+              <a:rPr lang="en-US" dirty="0"/>
+              <a:t>Does anything happen when I’m mounted? When I’m unmounted</a:t>
+            </a:r>
+            <a:r>
+              <a:rPr lang="en-US" dirty="0" smtClean="0"/>
+              <a:t>?</a:t>
+            </a:r>
+            <a:endParaRPr lang="en-US" dirty="0"/>
+          </a:p>
+          <a:p>
+            <a:r>
+              <a:rPr lang="en-US" dirty="0"/>
+              <a:t>Decide which constraints are worth testing and which aren’t</a:t>
+            </a:r>
+          </a:p>
+          <a:p>
+            <a:r>
+              <a:rPr lang="en-US" strike="sngStrike" dirty="0"/>
+              <a:t>Prop types are not worth </a:t>
+            </a:r>
+            <a:r>
+              <a:rPr lang="en-US" strike="sngStrike" dirty="0" smtClean="0"/>
+              <a:t>testing </a:t>
+            </a:r>
+            <a:r>
+              <a:rPr lang="en-US" dirty="0" smtClean="0"/>
+              <a:t> </a:t>
+            </a:r>
+            <a:r>
+              <a:rPr lang="en-US" i="1" dirty="0" smtClean="0"/>
+              <a:t>- because Typescript</a:t>
+            </a:r>
+            <a:endParaRPr lang="en-US" i="1" dirty="0"/>
+          </a:p>
+          <a:p>
+            <a:r>
+              <a:rPr lang="en-US" dirty="0"/>
+              <a:t>Inline styles are usually not worth </a:t>
+            </a:r>
+            <a:r>
+              <a:rPr lang="en-US" dirty="0" smtClean="0"/>
+              <a:t>testing</a:t>
+            </a:r>
+            <a:r>
+              <a:rPr lang="en-US" b="1" dirty="0" smtClean="0"/>
+              <a:t>, </a:t>
+            </a:r>
+            <a:r>
+              <a:rPr lang="en-US" b="1" dirty="0"/>
+              <a:t>unless they can change at runtime.</a:t>
+            </a:r>
+            <a:endParaRPr lang="en-US" dirty="0"/>
+          </a:p>
+          <a:p>
+            <a:r>
+              <a:rPr lang="en-US" dirty="0"/>
+              <a:t>The components you render and what props you give them are important to test</a:t>
+            </a:r>
+          </a:p>
+          <a:p>
+            <a:r>
+              <a:rPr lang="en-US" dirty="0"/>
+              <a:t>Don’t test things that are not the concern of your component</a:t>
+            </a:r>
+          </a:p>
+          <a:p>
             <a:endParaRPr lang="en-US" dirty="0"/>
           </a:p>
         </p:txBody>
@@ -5586,7 +5617,7 @@
     </p:spTree>
     <p:extLst>
       <p:ext uri="{BB962C8B-B14F-4D97-AF65-F5344CB8AC3E}">
-        <p14:creationId xmlns:p14="http://schemas.microsoft.com/office/powerpoint/2010/main" val="526572013"/>
+        <p14:creationId xmlns:p14="http://schemas.microsoft.com/office/powerpoint/2010/main" val="3839569085"/>
       </p:ext>
     </p:extLst>
   </p:cSld>
@@ -5637,7 +5668,7 @@
           <a:p>
             <a:r>
               <a:rPr lang="ru-RU" dirty="0" smtClean="0"/>
-              <a:t>Бонус</a:t>
+              <a:t>Примеры</a:t>
             </a:r>
             <a:endParaRPr lang="en-US" dirty="0"/>
           </a:p>
@@ -5655,26 +5686,92 @@
         </p:nvSpPr>
         <p:spPr/>
         <p:txBody>
-          <a:bodyPr/>
-          <a:lstStyle/>
-          <a:p>
-            <a:r>
-              <a:rPr lang="ru-RU" dirty="0" smtClean="0"/>
-              <a:t>Как увидеть покрытие</a:t>
-            </a:r>
-          </a:p>
-          <a:p>
-            <a:r>
-              <a:rPr lang="ru-RU" dirty="0" smtClean="0"/>
-              <a:t>Как запустить тесты перед </a:t>
-            </a:r>
-            <a:r>
-              <a:rPr lang="ru-RU" dirty="0" err="1" smtClean="0"/>
-              <a:t>комитом</a:t>
+          <a:bodyPr>
+            <a:normAutofit lnSpcReduction="10000"/>
+          </a:bodyPr>
+          <a:lstStyle/>
+          <a:p>
+            <a:r>
+              <a:rPr lang="en-US" dirty="0">
+                <a:hlinkClick r:id="rId2"/>
+              </a:rPr>
+              <a:t>https://github.com/facebook/jest/blob/master/e2e/__tests__/</a:t>
+            </a:r>
+            <a:r>
+              <a:rPr lang="en-US" dirty="0" smtClean="0">
+                <a:hlinkClick r:id="rId2"/>
+              </a:rPr>
+              <a:t>console.test.js</a:t>
             </a:r>
             <a:endParaRPr lang="ru-RU" dirty="0" smtClean="0"/>
           </a:p>
           <a:p>
+            <a:r>
+              <a:rPr lang="en-US" dirty="0">
+                <a:hlinkClick r:id="rId3"/>
+              </a:rPr>
+              <a:t>https://</a:t>
+            </a:r>
+            <a:r>
+              <a:rPr lang="en-US" dirty="0" smtClean="0">
+                <a:hlinkClick r:id="rId3"/>
+              </a:rPr>
+              <a:t>github.com/reduxjs/redux/blob/master/examples/tree-view/src/containers/Node.spec.js</a:t>
+            </a:r>
+            <a:endParaRPr lang="ru-RU" dirty="0" smtClean="0"/>
+          </a:p>
+          <a:p>
+            <a:r>
+              <a:rPr lang="en-US" dirty="0">
+                <a:hlinkClick r:id="rId4"/>
+              </a:rPr>
+              <a:t>https://</a:t>
+            </a:r>
+            <a:r>
+              <a:rPr lang="en-US" dirty="0" smtClean="0">
+                <a:hlinkClick r:id="rId4"/>
+              </a:rPr>
+              <a:t>github.com/reduxjs/redux/blob/master/examples/tree-view/src/reducers/index.spec.js</a:t>
+            </a:r>
+            <a:endParaRPr lang="ru-RU" dirty="0" smtClean="0"/>
+          </a:p>
+          <a:p>
+            <a:r>
+              <a:rPr lang="en-US" dirty="0">
+                <a:hlinkClick r:id="rId5"/>
+              </a:rPr>
+              <a:t>https://github.com/tb/redux/tree/react-testing/examples/todomvc/src/components/__tests</a:t>
+            </a:r>
+            <a:r>
+              <a:rPr lang="en-US" dirty="0" smtClean="0">
+                <a:hlinkClick r:id="rId5"/>
+              </a:rPr>
+              <a:t>__</a:t>
+            </a:r>
+            <a:endParaRPr lang="ru-RU" dirty="0" smtClean="0"/>
+          </a:p>
+          <a:p>
+            <a:r>
+              <a:rPr lang="en-US" dirty="0">
+                <a:hlinkClick r:id="rId6"/>
+              </a:rPr>
+              <a:t>https://</a:t>
+            </a:r>
+            <a:r>
+              <a:rPr lang="en-US" dirty="0" smtClean="0">
+                <a:hlinkClick r:id="rId6"/>
+              </a:rPr>
+              <a:t>github.com/mui-org/material-ui/blob/303199d39b42a321d28347d8440d69166f872f27/packages/material-ui/src/Checkbox/Checkbox.test.js</a:t>
+            </a:r>
+            <a:endParaRPr lang="en-US" dirty="0" smtClean="0"/>
+          </a:p>
+          <a:p>
+            <a:endParaRPr lang="en-US" dirty="0" smtClean="0"/>
+          </a:p>
+          <a:p>
+            <a:pPr marL="0" indent="0">
+              <a:buNone/>
+            </a:pPr>
             <a:endParaRPr lang="en-US" dirty="0"/>
           </a:p>
         </p:txBody>
@@ -5682,7 +5779,7 @@
     </p:spTree>
     <p:extLst>
       <p:ext uri="{BB962C8B-B14F-4D97-AF65-F5344CB8AC3E}">
-        <p14:creationId xmlns:p14="http://schemas.microsoft.com/office/powerpoint/2010/main" val="2230203390"/>
+        <p14:creationId xmlns:p14="http://schemas.microsoft.com/office/powerpoint/2010/main" val="526572013"/>
       </p:ext>
     </p:extLst>
   </p:cSld>
@@ -5733,6 +5830,102 @@
           <a:p>
             <a:r>
               <a:rPr lang="ru-RU" dirty="0" smtClean="0"/>
+              <a:t>Бонус</a:t>
+            </a:r>
+            <a:endParaRPr lang="en-US" dirty="0"/>
+          </a:p>
+        </p:txBody>
+      </p:sp>
+      <p:sp>
+        <p:nvSpPr>
+          <p:cNvPr id="3" name="Content Placeholder 2"/>
+          <p:cNvSpPr>
+            <a:spLocks noGrp="1"/>
+          </p:cNvSpPr>
+          <p:nvPr>
+            <p:ph idx="1"/>
+          </p:nvPr>
+        </p:nvSpPr>
+        <p:spPr/>
+        <p:txBody>
+          <a:bodyPr/>
+          <a:lstStyle/>
+          <a:p>
+            <a:r>
+              <a:rPr lang="ru-RU" dirty="0" smtClean="0"/>
+              <a:t>Как увидеть покрытие</a:t>
+            </a:r>
+          </a:p>
+          <a:p>
+            <a:r>
+              <a:rPr lang="ru-RU" dirty="0" smtClean="0"/>
+              <a:t>Как запустить тесты перед </a:t>
+            </a:r>
+            <a:r>
+              <a:rPr lang="ru-RU" dirty="0" err="1" smtClean="0"/>
+              <a:t>комитом</a:t>
+            </a:r>
+            <a:endParaRPr lang="ru-RU" dirty="0" smtClean="0"/>
+          </a:p>
+          <a:p>
+            <a:endParaRPr lang="en-US" dirty="0"/>
+          </a:p>
+        </p:txBody>
+      </p:sp>
+    </p:spTree>
+    <p:extLst>
+      <p:ext uri="{BB962C8B-B14F-4D97-AF65-F5344CB8AC3E}">
+        <p14:creationId xmlns:p14="http://schemas.microsoft.com/office/powerpoint/2010/main" val="2230203390"/>
+      </p:ext>
+    </p:extLst>
+  </p:cSld>
+  <p:clrMapOvr>
+    <a:masterClrMapping/>
+  </p:clrMapOvr>
+  <p:timing>
+    <p:tnLst>
+      <p:par>
+        <p:cTn id="1" dur="indefinite" restart="never" nodeType="tmRoot"/>
+      </p:par>
+    </p:tnLst>
+  </p:timing>
+</p:sld>
+</file>
+
+<file path=ppt/slides/slide25.xml><?xml version="1.0" encoding="utf-8"?>
+<p:sld xmlns:a="http://schemas.openxmlformats.org/drawingml/2006/main" xmlns:r="http://schemas.openxmlformats.org/officeDocument/2006/relationships" xmlns:p="http://schemas.openxmlformats.org/presentationml/2006/main">
+  <p:cSld>
+    <p:spTree>
+      <p:nvGrpSpPr>
+        <p:cNvPr id="1" name=""/>
+        <p:cNvGrpSpPr/>
+        <p:nvPr/>
+      </p:nvGrpSpPr>
+      <p:grpSpPr>
+        <a:xfrm>
+          <a:off x="0" y="0"/>
+          <a:ext cx="0" cy="0"/>
+          <a:chOff x="0" y="0"/>
+          <a:chExt cx="0" cy="0"/>
+        </a:xfrm>
+      </p:grpSpPr>
+      <p:sp>
+        <p:nvSpPr>
+          <p:cNvPr id="2" name="Title 1"/>
+          <p:cNvSpPr>
+            <a:spLocks noGrp="1"/>
+          </p:cNvSpPr>
+          <p:nvPr>
+            <p:ph type="title"/>
+          </p:nvPr>
+        </p:nvSpPr>
+        <p:spPr/>
+        <p:txBody>
+          <a:bodyPr/>
+          <a:lstStyle/>
+          <a:p>
+            <a:r>
+              <a:rPr lang="ru-RU" dirty="0" smtClean="0"/>
               <a:t>Ссылки</a:t>
             </a:r>
             <a:endParaRPr lang="en-US" dirty="0"/>
@@ -5752,7 +5945,7 @@
         <p:spPr/>
         <p:txBody>
           <a:bodyPr>
-            <a:normAutofit fontScale="77500" lnSpcReduction="20000"/>
+            <a:normAutofit fontScale="70000" lnSpcReduction="20000"/>
           </a:bodyPr>
           <a:lstStyle/>
           <a:p>
@@ -5887,6 +6080,21 @@
                 <a:hlinkClick r:id="rId10"/>
               </a:rPr>
               <a:t>github.com/facebook/create-react-app/blob/master/packages/react-scripts/template/README.md#running-tests</a:t>
+            </a:r>
+            <a:endParaRPr lang="en-US" dirty="0" smtClean="0"/>
+          </a:p>
+          <a:p>
+            <a:r>
+              <a:rPr lang="en-US" dirty="0">
+                <a:hlinkClick r:id="rId11"/>
+              </a:rPr>
+              <a:t>https://</a:t>
+            </a:r>
+            <a:r>
+              <a:rPr lang="en-US" dirty="0" smtClean="0">
+                <a:hlinkClick r:id="rId11"/>
+              </a:rPr>
+              <a:t>medium.freecodecamp.org/the-right-way-to-test-react-components-548a4736ab22</a:t>
             </a:r>
             <a:endParaRPr lang="ru-RU" dirty="0" smtClean="0"/>
           </a:p>

</xml_diff>